<commit_message>
Updated dVRK component view
</commit_message>
<xml_diff>
--- a/dVRK-component-thread-view.pptx
+++ b/dVRK-component-thread-view.pptx
@@ -328,7 +328,7 @@
               <a:pPr>
                 <a:defRPr/>
               </a:pPr>
-              <a:t>10/27/15</a:t>
+              <a:t>11/22/16</a:t>
             </a:fld>
             <a:endParaRPr lang="en-US"/>
           </a:p>
@@ -520,7 +520,7 @@
               <a:pPr>
                 <a:defRPr/>
               </a:pPr>
-              <a:t>10/27/15</a:t>
+              <a:t>11/22/16</a:t>
             </a:fld>
             <a:endParaRPr lang="en-US"/>
           </a:p>
@@ -722,7 +722,7 @@
               <a:pPr>
                 <a:defRPr/>
               </a:pPr>
-              <a:t>10/27/15</a:t>
+              <a:t>11/22/16</a:t>
             </a:fld>
             <a:endParaRPr lang="en-US"/>
           </a:p>
@@ -914,7 +914,7 @@
               <a:pPr>
                 <a:defRPr/>
               </a:pPr>
-              <a:t>10/27/15</a:t>
+              <a:t>11/22/16</a:t>
             </a:fld>
             <a:endParaRPr lang="en-US"/>
           </a:p>
@@ -1182,7 +1182,7 @@
               <a:pPr>
                 <a:defRPr/>
               </a:pPr>
-              <a:t>10/27/15</a:t>
+              <a:t>11/22/16</a:t>
             </a:fld>
             <a:endParaRPr lang="en-US"/>
           </a:p>
@@ -1492,7 +1492,7 @@
               <a:pPr>
                 <a:defRPr/>
               </a:pPr>
-              <a:t>10/27/15</a:t>
+              <a:t>11/22/16</a:t>
             </a:fld>
             <a:endParaRPr lang="en-US"/>
           </a:p>
@@ -1936,7 +1936,7 @@
               <a:pPr>
                 <a:defRPr/>
               </a:pPr>
-              <a:t>10/27/15</a:t>
+              <a:t>11/22/16</a:t>
             </a:fld>
             <a:endParaRPr lang="en-US"/>
           </a:p>
@@ -2076,7 +2076,7 @@
               <a:pPr>
                 <a:defRPr/>
               </a:pPr>
-              <a:t>10/27/15</a:t>
+              <a:t>11/22/16</a:t>
             </a:fld>
             <a:endParaRPr lang="en-US"/>
           </a:p>
@@ -2193,7 +2193,7 @@
               <a:pPr>
                 <a:defRPr/>
               </a:pPr>
-              <a:t>10/27/15</a:t>
+              <a:t>11/22/16</a:t>
             </a:fld>
             <a:endParaRPr lang="en-US"/>
           </a:p>
@@ -2492,7 +2492,7 @@
               <a:pPr>
                 <a:defRPr/>
               </a:pPr>
-              <a:t>10/27/15</a:t>
+              <a:t>11/22/16</a:t>
             </a:fld>
             <a:endParaRPr lang="en-US"/>
           </a:p>
@@ -2770,7 +2770,7 @@
               <a:pPr>
                 <a:defRPr/>
               </a:pPr>
-              <a:t>10/27/15</a:t>
+              <a:t>11/22/16</a:t>
             </a:fld>
             <a:endParaRPr lang="en-US"/>
           </a:p>
@@ -3025,7 +3025,7 @@
               <a:pPr>
                 <a:defRPr/>
               </a:pPr>
-              <a:t>10/27/15</a:t>
+              <a:t>11/22/16</a:t>
             </a:fld>
             <a:endParaRPr lang="en-US"/>
           </a:p>
@@ -3549,6 +3549,65 @@
       </p:grpSpPr>
       <p:sp>
         <p:nvSpPr>
+          <p:cNvPr id="185" name="Snip Diagonal Corner Rectangle 184"/>
+          <p:cNvSpPr/>
+          <p:nvPr/>
+        </p:nvSpPr>
+        <p:spPr>
+          <a:xfrm>
+            <a:off x="7595134" y="2675648"/>
+            <a:ext cx="990600" cy="2515888"/>
+          </a:xfrm>
+          <a:prstGeom prst="snip2DiagRect">
+            <a:avLst>
+              <a:gd name="adj1" fmla="val 0"/>
+              <a:gd name="adj2" fmla="val 2749"/>
+            </a:avLst>
+          </a:prstGeom>
+          <a:ln w="6350" cmpd="sng">
+            <a:prstDash val="dot"/>
+          </a:ln>
+          <a:effectLst>
+            <a:outerShdw blurRad="50800" dist="38100" algn="l" rotWithShape="0">
+              <a:prstClr val="black">
+                <a:alpha val="40000"/>
+              </a:prstClr>
+            </a:outerShdw>
+          </a:effectLst>
+        </p:spPr>
+        <p:style>
+          <a:lnRef idx="2">
+            <a:schemeClr val="dk1"/>
+          </a:lnRef>
+          <a:fillRef idx="1">
+            <a:schemeClr val="lt1"/>
+          </a:fillRef>
+          <a:effectRef idx="0">
+            <a:schemeClr val="dk1"/>
+          </a:effectRef>
+          <a:fontRef idx="minor">
+            <a:schemeClr val="dk1"/>
+          </a:fontRef>
+        </p:style>
+        <p:txBody>
+          <a:bodyPr tIns="0" bIns="0" anchor="b" anchorCtr="0"/>
+          <a:lstStyle/>
+          <a:p>
+            <a:pPr algn="ctr"/>
+            <a:r>
+              <a:rPr lang="en-US" sz="1000" dirty="0" smtClean="0">
+                <a:solidFill>
+                  <a:srgbClr val="000000"/>
+                </a:solidFill>
+              </a:rPr>
+              <a:t>Subscribers</a:t>
+            </a:r>
+            <a:endParaRPr lang="en-US" sz="1000" dirty="0"/>
+          </a:p>
+        </p:txBody>
+      </p:sp>
+      <p:sp>
+        <p:nvSpPr>
           <p:cNvPr id="136" name="Snip Diagonal Corner Rectangle 135"/>
           <p:cNvSpPr/>
           <p:nvPr/>
@@ -4395,8 +4454,8 @@
         </p:nvSpPr>
         <p:spPr bwMode="auto">
           <a:xfrm>
-            <a:off x="6657736" y="4227262"/>
-            <a:ext cx="881729" cy="801938"/>
+            <a:off x="6657736" y="4586864"/>
+            <a:ext cx="881729" cy="442336"/>
           </a:xfrm>
           <a:prstGeom prst="snip2DiagRect">
             <a:avLst>
@@ -5203,8 +5262,8 @@
         </p:nvSpPr>
         <p:spPr bwMode="auto">
           <a:xfrm>
-            <a:off x="7652670" y="2743200"/>
-            <a:ext cx="881729" cy="2400138"/>
+            <a:off x="7652670" y="2743201"/>
+            <a:ext cx="881729" cy="1429600"/>
           </a:xfrm>
           <a:prstGeom prst="snip2DiagRect">
             <a:avLst>
@@ -5248,14 +5307,6 @@
               </a:spcAft>
               <a:defRPr/>
             </a:pPr>
-            <a:r>
-              <a:rPr lang="en-US" sz="1000" dirty="0" smtClean="0">
-                <a:solidFill>
-                  <a:srgbClr val="000000"/>
-                </a:solidFill>
-              </a:rPr>
-              <a:t>Subscribers</a:t>
-            </a:r>
             <a:endParaRPr lang="en-US" dirty="0"/>
           </a:p>
         </p:txBody>
@@ -5295,20 +5346,20 @@
           <a:p>
             <a:pPr algn="ctr"/>
             <a:r>
-              <a:rPr lang="en-US" sz="1000" dirty="0" err="1">
+              <a:rPr lang="en-US" sz="1000" dirty="0" err="1" smtClean="0">
                 <a:solidFill>
                   <a:srgbClr val="000000"/>
                 </a:solidFill>
               </a:rPr>
-              <a:t>sawROS</a:t>
+              <a:t>saw</a:t>
             </a:r>
             <a:r>
-              <a:rPr lang="en-US" sz="1000" dirty="0">
+              <a:rPr lang="en-US" sz="1000" dirty="0" err="1" smtClean="0">
                 <a:solidFill>
                   <a:srgbClr val="000000"/>
                 </a:solidFill>
               </a:rPr>
-              <a:t> </a:t>
+              <a:t>ROS</a:t>
             </a:r>
             <a:r>
               <a:rPr lang="en-US" sz="1000" dirty="0" smtClean="0">
@@ -5316,7 +5367,7 @@
                   <a:srgbClr val="000000"/>
                 </a:solidFill>
               </a:rPr>
-              <a:t> </a:t>
+              <a:t>  </a:t>
             </a:r>
             <a:r>
               <a:rPr lang="en-US" sz="1000" i="1" dirty="0" smtClean="0">
@@ -5431,21 +5482,34 @@
             <a:p>
               <a:pPr algn="ctr"/>
               <a:r>
-                <a:rPr lang="en-US" sz="1000">
+                <a:rPr lang="en-US" sz="1000" dirty="0" err="1" smtClean="0">
                   <a:solidFill>
                     <a:srgbClr val="000000"/>
                   </a:solidFill>
                 </a:rPr>
-                <a:t>sawROS  </a:t>
+                <a:t>sawROS</a:t>
               </a:r>
               <a:r>
-                <a:rPr lang="en-US" sz="1000" i="1">
+                <a:rPr lang="en-US" sz="1000" dirty="0" smtClean="0">
+                  <a:solidFill>
+                    <a:srgbClr val="000000"/>
+                  </a:solidFill>
+                </a:rPr>
+                <a:t>  </a:t>
+              </a:r>
+              <a:r>
+                <a:rPr lang="en-US" sz="1000" i="1" dirty="0" err="1">
                   <a:solidFill>
                     <a:srgbClr val="000000"/>
                   </a:solidFill>
                 </a:rPr>
                 <a:t>teleoperation</a:t>
               </a:r>
+              <a:endParaRPr lang="en-US" sz="1000" i="1" dirty="0">
+                <a:solidFill>
+                  <a:srgbClr val="000000"/>
+                </a:solidFill>
+              </a:endParaRPr>
             </a:p>
           </p:txBody>
         </p:sp>
@@ -5547,7 +5611,7 @@
             <a:p>
               <a:pPr algn="ctr"/>
               <a:r>
-                <a:rPr lang="en-US" sz="1000" dirty="0" err="1">
+                <a:rPr lang="en-US" sz="1000" dirty="0" err="1" smtClean="0">
                   <a:solidFill>
                     <a:srgbClr val="000000"/>
                   </a:solidFill>
@@ -5555,7 +5619,7 @@
                 <a:t>sawROS</a:t>
               </a:r>
               <a:r>
-                <a:rPr lang="en-US" sz="1000" dirty="0">
+                <a:rPr lang="en-US" sz="1000" dirty="0" smtClean="0">
                   <a:solidFill>
                     <a:srgbClr val="000000"/>
                   </a:solidFill>
@@ -5676,235 +5740,30 @@
             <a:p>
               <a:pPr algn="ctr"/>
               <a:r>
-                <a:rPr lang="en-US" sz="1000">
+                <a:rPr lang="en-US" sz="1000" dirty="0" err="1" smtClean="0">
                   <a:solidFill>
                     <a:srgbClr val="000000"/>
                   </a:solidFill>
                 </a:rPr>
-                <a:t>sawROS  </a:t>
+                <a:t>sawROS</a:t>
               </a:r>
               <a:r>
-                <a:rPr lang="en-US" sz="1000" i="1">
+                <a:rPr lang="en-US" sz="1000" dirty="0" smtClean="0">
+                  <a:solidFill>
+                    <a:srgbClr val="000000"/>
+                  </a:solidFill>
+                </a:rPr>
+                <a:t>  </a:t>
+              </a:r>
+              <a:r>
+                <a:rPr lang="en-US" sz="1000" i="1" dirty="0" err="1">
                   <a:solidFill>
                     <a:srgbClr val="000000"/>
                   </a:solidFill>
                 </a:rPr>
                 <a:t>mtm</a:t>
               </a:r>
-              <a:endParaRPr lang="en-US" sz="1000">
-                <a:solidFill>
-                  <a:srgbClr val="000000"/>
-                </a:solidFill>
-              </a:endParaRPr>
-            </a:p>
-          </p:txBody>
-        </p:sp>
-      </p:grpSp>
-      <p:grpSp>
-        <p:nvGrpSpPr>
-          <p:cNvPr id="13376" name="Group 107"/>
-          <p:cNvGrpSpPr>
-            <a:grpSpLocks/>
-          </p:cNvGrpSpPr>
-          <p:nvPr/>
-        </p:nvGrpSpPr>
-        <p:grpSpPr bwMode="auto">
-          <a:xfrm>
-            <a:off x="6715949" y="4267200"/>
-            <a:ext cx="1727618" cy="281617"/>
-            <a:chOff x="6687915" y="3892529"/>
-            <a:chExt cx="1719064" cy="361122"/>
-          </a:xfrm>
-        </p:grpSpPr>
-        <p:sp>
-          <p:nvSpPr>
-            <p:cNvPr id="105" name="Rounded Rectangle 104"/>
-            <p:cNvSpPr/>
-            <p:nvPr/>
-          </p:nvSpPr>
-          <p:spPr>
-            <a:xfrm>
-              <a:off x="6688694" y="4058765"/>
-              <a:ext cx="1550059" cy="195224"/>
-            </a:xfrm>
-            <a:prstGeom prst="roundRect">
-              <a:avLst/>
-            </a:prstGeom>
-          </p:spPr>
-          <p:style>
-            <a:lnRef idx="1">
-              <a:schemeClr val="accent4"/>
-            </a:lnRef>
-            <a:fillRef idx="2">
-              <a:schemeClr val="accent4"/>
-            </a:fillRef>
-            <a:effectRef idx="1">
-              <a:schemeClr val="accent4"/>
-            </a:effectRef>
-            <a:fontRef idx="minor">
-              <a:schemeClr val="dk1"/>
-            </a:fontRef>
-          </p:style>
-          <p:txBody>
-            <a:bodyPr anchor="ctr"/>
-            <a:lstStyle/>
-            <a:p>
-              <a:pPr algn="ctr" fontAlgn="auto">
-                <a:spcBef>
-                  <a:spcPts val="0"/>
-                </a:spcBef>
-                <a:spcAft>
-                  <a:spcPts val="0"/>
-                </a:spcAft>
-                <a:defRPr/>
-              </a:pPr>
-              <a:endParaRPr lang="en-US" sz="1000" i="1" dirty="0"/>
-            </a:p>
-          </p:txBody>
-        </p:sp>
-        <p:sp>
-          <p:nvSpPr>
-            <p:cNvPr id="106" name="Rounded Rectangle 105"/>
-            <p:cNvSpPr/>
-            <p:nvPr/>
-          </p:nvSpPr>
-          <p:spPr>
-            <a:xfrm>
-              <a:off x="6744222" y="4003213"/>
-              <a:ext cx="1550060" cy="195225"/>
-            </a:xfrm>
-            <a:prstGeom prst="roundRect">
-              <a:avLst/>
-            </a:prstGeom>
-          </p:spPr>
-          <p:style>
-            <a:lnRef idx="1">
-              <a:schemeClr val="accent4"/>
-            </a:lnRef>
-            <a:fillRef idx="2">
-              <a:schemeClr val="accent4"/>
-            </a:fillRef>
-            <a:effectRef idx="1">
-              <a:schemeClr val="accent4"/>
-            </a:effectRef>
-            <a:fontRef idx="minor">
-              <a:schemeClr val="dk1"/>
-            </a:fontRef>
-          </p:style>
-          <p:txBody>
-            <a:bodyPr anchor="ctr"/>
-            <a:lstStyle/>
-            <a:p>
-              <a:pPr algn="ctr" fontAlgn="auto">
-                <a:spcBef>
-                  <a:spcPts val="0"/>
-                </a:spcBef>
-                <a:spcAft>
-                  <a:spcPts val="0"/>
-                </a:spcAft>
-                <a:defRPr/>
-              </a:pPr>
-              <a:endParaRPr lang="en-US" sz="1000" i="1" dirty="0"/>
-            </a:p>
-          </p:txBody>
-        </p:sp>
-        <p:sp>
-          <p:nvSpPr>
-            <p:cNvPr id="102" name="Rounded Rectangle 101"/>
-            <p:cNvSpPr/>
-            <p:nvPr/>
-          </p:nvSpPr>
-          <p:spPr>
-            <a:xfrm>
-              <a:off x="6801338" y="3947662"/>
-              <a:ext cx="1550060" cy="195224"/>
-            </a:xfrm>
-            <a:prstGeom prst="roundRect">
-              <a:avLst/>
-            </a:prstGeom>
-          </p:spPr>
-          <p:style>
-            <a:lnRef idx="1">
-              <a:schemeClr val="accent4"/>
-            </a:lnRef>
-            <a:fillRef idx="2">
-              <a:schemeClr val="accent4"/>
-            </a:fillRef>
-            <a:effectRef idx="1">
-              <a:schemeClr val="accent4"/>
-            </a:effectRef>
-            <a:fontRef idx="minor">
-              <a:schemeClr val="dk1"/>
-            </a:fontRef>
-          </p:style>
-          <p:txBody>
-            <a:bodyPr anchor="ctr"/>
-            <a:lstStyle/>
-            <a:p>
-              <a:pPr algn="ctr" fontAlgn="auto">
-                <a:spcBef>
-                  <a:spcPts val="0"/>
-                </a:spcBef>
-                <a:spcAft>
-                  <a:spcPts val="0"/>
-                </a:spcAft>
-                <a:defRPr/>
-              </a:pPr>
-              <a:endParaRPr lang="en-US" sz="1000" i="1" dirty="0"/>
-            </a:p>
-          </p:txBody>
-        </p:sp>
-        <p:sp>
-          <p:nvSpPr>
-            <p:cNvPr id="103" name="Rounded Rectangle 102"/>
-            <p:cNvSpPr/>
-            <p:nvPr/>
-          </p:nvSpPr>
-          <p:spPr>
-            <a:xfrm>
-              <a:off x="6856868" y="3892110"/>
-              <a:ext cx="1550059" cy="195225"/>
-            </a:xfrm>
-            <a:prstGeom prst="roundRect">
-              <a:avLst/>
-            </a:prstGeom>
-          </p:spPr>
-          <p:style>
-            <a:lnRef idx="1">
-              <a:schemeClr val="accent4"/>
-            </a:lnRef>
-            <a:fillRef idx="2">
-              <a:schemeClr val="accent4"/>
-            </a:fillRef>
-            <a:effectRef idx="1">
-              <a:schemeClr val="accent4"/>
-            </a:effectRef>
-            <a:fontRef idx="minor">
-              <a:schemeClr val="dk1"/>
-            </a:fontRef>
-          </p:style>
-          <p:txBody>
-            <a:bodyPr anchor="ctr"/>
-            <a:lstStyle/>
-            <a:p>
-              <a:pPr algn="ctr"/>
-              <a:r>
-                <a:rPr lang="en-US" sz="1000">
-                  <a:solidFill>
-                    <a:srgbClr val="000000"/>
-                  </a:solidFill>
-                </a:rPr>
-                <a:t>sawROS  </a:t>
-              </a:r>
-              <a:r>
-                <a:rPr lang="en-US" sz="1000" i="1">
-                  <a:solidFill>
-                    <a:srgbClr val="000000"/>
-                  </a:solidFill>
-                </a:rPr>
-                <a:t>pid</a:t>
-              </a:r>
-              <a:endParaRPr lang="en-US" sz="1000">
+              <a:endParaRPr lang="en-US" sz="1000" dirty="0">
                 <a:solidFill>
                   <a:srgbClr val="000000"/>
                 </a:solidFill>
@@ -5923,10 +5782,10 @@
         </p:nvGrpSpPr>
         <p:grpSpPr bwMode="auto">
           <a:xfrm>
-            <a:off x="6715949" y="4648200"/>
-            <a:ext cx="1727618" cy="281617"/>
-            <a:chOff x="6687915" y="3892529"/>
-            <a:chExt cx="1719064" cy="361122"/>
+            <a:off x="6716323" y="4647963"/>
+            <a:ext cx="796517" cy="282208"/>
+            <a:chOff x="6688694" y="3892216"/>
+            <a:chExt cx="1718233" cy="361879"/>
           </a:xfrm>
         </p:grpSpPr>
         <p:sp>
@@ -6075,8 +5934,8 @@
           </p:nvSpPr>
           <p:spPr>
             <a:xfrm>
-              <a:off x="6856868" y="3892216"/>
-              <a:ext cx="1550059" cy="195225"/>
+              <a:off x="6856869" y="3892216"/>
+              <a:ext cx="1550058" cy="195224"/>
             </a:xfrm>
             <a:prstGeom prst="roundRect">
               <a:avLst/>
@@ -6102,22 +5961,30 @@
             <a:p>
               <a:pPr algn="ctr"/>
               <a:r>
-                <a:rPr lang="en-US" sz="1000">
+                <a:rPr lang="en-US" sz="900" dirty="0" err="1" smtClean="0">
                   <a:solidFill>
                     <a:srgbClr val="000000"/>
                   </a:solidFill>
                 </a:rPr>
-                <a:t>sawROS  </a:t>
+                <a:t>sawROS</a:t>
               </a:r>
               <a:r>
-                <a:rPr lang="en-US" sz="1000" i="1">
+                <a:rPr lang="en-US" sz="1000" dirty="0" smtClean="0">
+                  <a:solidFill>
+                    <a:srgbClr val="000000"/>
+                  </a:solidFill>
+                </a:rPr>
+                <a:t>  </a:t>
+              </a:r>
+              <a:r>
+                <a:rPr lang="en-US" sz="1000" i="1" dirty="0" err="1">
                   <a:solidFill>
                     <a:srgbClr val="000000"/>
                   </a:solidFill>
                 </a:rPr>
                 <a:t>io</a:t>
               </a:r>
-              <a:endParaRPr lang="en-US" sz="1000">
+              <a:endParaRPr lang="en-US" sz="1000" dirty="0">
                 <a:solidFill>
                   <a:srgbClr val="000000"/>
                 </a:solidFill>
@@ -7428,18 +7295,16 @@
       </p:grpSp>
       <p:grpSp>
         <p:nvGrpSpPr>
-          <p:cNvPr id="13335" name="Group 178"/>
-          <p:cNvGrpSpPr>
-            <a:grpSpLocks/>
-          </p:cNvGrpSpPr>
+          <p:cNvPr id="2" name="Group 1"/>
+          <p:cNvGrpSpPr/>
           <p:nvPr/>
         </p:nvGrpSpPr>
-        <p:grpSpPr bwMode="auto">
+        <p:grpSpPr>
           <a:xfrm>
             <a:off x="6499888" y="2811896"/>
             <a:ext cx="272650" cy="2076324"/>
-            <a:chOff x="1882439" y="2077543"/>
-            <a:chExt cx="271151" cy="2662314"/>
+            <a:chOff x="6499888" y="2811896"/>
+            <a:chExt cx="272650" cy="2076324"/>
           </a:xfrm>
         </p:grpSpPr>
         <p:sp>
@@ -7448,10 +7313,10 @@
             <p:cNvSpPr/>
             <p:nvPr/>
           </p:nvSpPr>
-          <p:spPr>
+          <p:spPr bwMode="auto">
             <a:xfrm>
-              <a:off x="1882439" y="2077543"/>
-              <a:ext cx="269566" cy="195209"/>
+              <a:off x="6499888" y="2811896"/>
+              <a:ext cx="271056" cy="152242"/>
             </a:xfrm>
             <a:prstGeom prst="leftRightArrow">
               <a:avLst/>
@@ -7495,10 +7360,10 @@
             <p:cNvSpPr/>
             <p:nvPr/>
           </p:nvSpPr>
-          <p:spPr>
+          <p:spPr bwMode="auto">
             <a:xfrm>
-              <a:off x="1884024" y="2619527"/>
-              <a:ext cx="269566" cy="195210"/>
+              <a:off x="6501482" y="3234586"/>
+              <a:ext cx="271056" cy="152243"/>
             </a:xfrm>
             <a:prstGeom prst="leftRightArrow">
               <a:avLst/>
@@ -7542,57 +7407,10 @@
             <p:cNvSpPr/>
             <p:nvPr/>
           </p:nvSpPr>
-          <p:spPr>
+          <p:spPr bwMode="auto">
             <a:xfrm>
-              <a:off x="1884024" y="3281337"/>
-              <a:ext cx="269566" cy="195209"/>
-            </a:xfrm>
-            <a:prstGeom prst="leftRightArrow">
-              <a:avLst/>
-            </a:prstGeom>
-            <a:ln w="6350" cmpd="sng"/>
-          </p:spPr>
-          <p:style>
-            <a:lnRef idx="2">
-              <a:schemeClr val="dk1"/>
-            </a:lnRef>
-            <a:fillRef idx="1">
-              <a:schemeClr val="lt1"/>
-            </a:fillRef>
-            <a:effectRef idx="0">
-              <a:schemeClr val="dk1"/>
-            </a:effectRef>
-            <a:fontRef idx="minor">
-              <a:schemeClr val="dk1"/>
-            </a:fontRef>
-          </p:style>
-          <p:txBody>
-            <a:bodyPr anchor="ctr"/>
-            <a:lstStyle/>
-            <a:p>
-              <a:pPr algn="ctr" fontAlgn="auto">
-                <a:spcBef>
-                  <a:spcPts val="0"/>
-                </a:spcBef>
-                <a:spcAft>
-                  <a:spcPts val="0"/>
-                </a:spcAft>
-                <a:defRPr/>
-              </a:pPr>
-              <a:endParaRPr lang="en-US"/>
-            </a:p>
-          </p:txBody>
-        </p:sp>
-        <p:sp>
-          <p:nvSpPr>
-            <p:cNvPr id="183" name="Left-Right Arrow 182"/>
-            <p:cNvSpPr/>
-            <p:nvPr/>
-          </p:nvSpPr>
-          <p:spPr>
-            <a:xfrm>
-              <a:off x="1884024" y="3930450"/>
-              <a:ext cx="269566" cy="195210"/>
+              <a:off x="6501482" y="3750728"/>
+              <a:ext cx="271056" cy="152242"/>
             </a:xfrm>
             <a:prstGeom prst="leftRightArrow">
               <a:avLst/>
@@ -7636,10 +7454,10 @@
             <p:cNvSpPr/>
             <p:nvPr/>
           </p:nvSpPr>
-          <p:spPr>
+          <p:spPr bwMode="auto">
             <a:xfrm>
-              <a:off x="1884024" y="4544648"/>
-              <a:ext cx="269566" cy="195209"/>
+              <a:off x="6501482" y="4735978"/>
+              <a:ext cx="271056" cy="152242"/>
             </a:xfrm>
             <a:prstGeom prst="leftRightArrow">
               <a:avLst/>

</xml_diff>